<commit_message>
added charr5 and object enlargement
</commit_message>
<xml_diff>
--- a/seam-carving.pptx
+++ b/seam-carving.pptx
@@ -6,15 +6,23 @@
   </p:sldMasterIdLst>
   <p:sldIdLst>
     <p:sldId id="256" r:id="rId2"/>
-    <p:sldId id="259" r:id="rId3"/>
-    <p:sldId id="261" r:id="rId4"/>
-    <p:sldId id="260" r:id="rId5"/>
-    <p:sldId id="257" r:id="rId6"/>
-    <p:sldId id="258" r:id="rId7"/>
-    <p:sldId id="262" r:id="rId8"/>
-    <p:sldId id="263" r:id="rId9"/>
-    <p:sldId id="264" r:id="rId10"/>
-    <p:sldId id="265" r:id="rId11"/>
+    <p:sldId id="261" r:id="rId3"/>
+    <p:sldId id="270" r:id="rId4"/>
+    <p:sldId id="257" r:id="rId5"/>
+    <p:sldId id="269" r:id="rId6"/>
+    <p:sldId id="259" r:id="rId7"/>
+    <p:sldId id="258" r:id="rId8"/>
+    <p:sldId id="260" r:id="rId9"/>
+    <p:sldId id="262" r:id="rId10"/>
+    <p:sldId id="263" r:id="rId11"/>
+    <p:sldId id="264" r:id="rId12"/>
+    <p:sldId id="265" r:id="rId13"/>
+    <p:sldId id="266" r:id="rId14"/>
+    <p:sldId id="267" r:id="rId15"/>
+    <p:sldId id="271" r:id="rId16"/>
+    <p:sldId id="272" r:id="rId17"/>
+    <p:sldId id="273" r:id="rId18"/>
+    <p:sldId id="268" r:id="rId19"/>
   </p:sldIdLst>
   <p:sldSz cx="9144000" cy="6858000" type="screen4x3"/>
   <p:notesSz cx="6858000" cy="9144000"/>
@@ -3152,6 +3160,13 @@
   <p:clrMapOvr>
     <a:masterClrMapping/>
   </p:clrMapOvr>
+  <p:timing>
+    <p:tnLst>
+      <p:par>
+        <p:cTn xmlns:p14="http://schemas.microsoft.com/office/powerpoint/2010/main" id="1" dur="indefinite" restart="never" nodeType="tmRoot"/>
+      </p:par>
+    </p:tnLst>
+  </p:timing>
 </p:sld>
 </file>
 
@@ -3191,39 +3206,57 @@
           </a:p>
         </p:txBody>
       </p:sp>
-      <p:sp>
-        <p:nvSpPr>
-          <p:cNvPr id="3" name="Content Placeholder 2"/>
-          <p:cNvSpPr>
-            <a:spLocks noGrp="1"/>
-          </p:cNvSpPr>
-          <p:nvPr>
-            <p:ph idx="1"/>
-          </p:nvPr>
-        </p:nvSpPr>
-        <p:spPr/>
-        <p:txBody>
-          <a:bodyPr/>
-          <a:lstStyle/>
-          <a:p>
-            <a:endParaRPr lang="en-US"/>
-          </a:p>
-        </p:txBody>
-      </p:sp>
+      <p:pic>
+        <p:nvPicPr>
+          <p:cNvPr id="6" name="Picture 5" descr="night_seams.jpg"/>
+          <p:cNvPicPr>
+            <a:picLocks noChangeAspect="1"/>
+          </p:cNvPicPr>
+          <p:nvPr/>
+        </p:nvPicPr>
+        <p:blipFill>
+          <a:blip r:embed="rId2">
+            <a:extLst>
+              <a:ext uri="{28A0092B-C50C-407E-A947-70E740481C1C}">
+                <a14:useLocalDpi xmlns:a14="http://schemas.microsoft.com/office/drawing/2010/main" val="0"/>
+              </a:ext>
+            </a:extLst>
+          </a:blip>
+          <a:stretch>
+            <a:fillRect/>
+          </a:stretch>
+        </p:blipFill>
+        <p:spPr>
+          <a:xfrm>
+            <a:off x="1890761" y="274638"/>
+            <a:ext cx="4762500" cy="6350000"/>
+          </a:xfrm>
+          <a:prstGeom prst="rect">
+            <a:avLst/>
+          </a:prstGeom>
+        </p:spPr>
+      </p:pic>
     </p:spTree>
     <p:extLst>
       <p:ext uri="{BB962C8B-B14F-4D97-AF65-F5344CB8AC3E}">
-        <p14:creationId xmlns:p14="http://schemas.microsoft.com/office/powerpoint/2010/main" val="2369259043"/>
+        <p14:creationId xmlns:p14="http://schemas.microsoft.com/office/powerpoint/2010/main" val="3936392864"/>
       </p:ext>
     </p:extLst>
   </p:cSld>
   <p:clrMapOvr>
     <a:masterClrMapping/>
   </p:clrMapOvr>
+  <p:timing>
+    <p:tnLst>
+      <p:par>
+        <p:cTn xmlns:p14="http://schemas.microsoft.com/office/powerpoint/2010/main" id="1" dur="indefinite" restart="never" nodeType="tmRoot"/>
+      </p:par>
+    </p:tnLst>
+  </p:timing>
 </p:sld>
 </file>
 
-<file path=ppt/slides/slide2.xml><?xml version="1.0" encoding="utf-8"?>
+<file path=ppt/slides/slide11.xml><?xml version="1.0" encoding="utf-8"?>
 <p:sld xmlns:a="http://schemas.openxmlformats.org/drawingml/2006/main" xmlns:r="http://schemas.openxmlformats.org/officeDocument/2006/relationships" xmlns:p="http://schemas.openxmlformats.org/presentationml/2006/main">
   <p:cSld>
     <p:spTree>
@@ -3255,23 +3288,17 @@
           <a:bodyPr/>
           <a:lstStyle/>
           <a:p>
-            <a:r>
-              <a:rPr lang="en-US" dirty="0" err="1" smtClean="0"/>
-              <a:t>Scharr</a:t>
-            </a:r>
-            <a:endParaRPr lang="en-US" dirty="0"/>
+            <a:endParaRPr lang="en-US"/>
           </a:p>
         </p:txBody>
       </p:sp>
       <p:pic>
         <p:nvPicPr>
-          <p:cNvPr id="4" name="Content Placeholder 3" descr="scharr.jpg"/>
+          <p:cNvPr id="4" name="Picture 3" descr="night_shrank.jpg"/>
           <p:cNvPicPr>
-            <a:picLocks noGrp="1" noChangeAspect="1"/>
+            <a:picLocks noChangeAspect="1"/>
           </p:cNvPicPr>
-          <p:nvPr>
-            <p:ph idx="1"/>
-          </p:nvPr>
+          <p:nvPr/>
         </p:nvPicPr>
         <p:blipFill>
           <a:blip r:embed="rId2">
@@ -3281,17 +3308,368 @@
               </a:ext>
             </a:extLst>
           </a:blip>
-          <a:srcRect t="2081" b="2081"/>
           <a:stretch>
             <a:fillRect/>
           </a:stretch>
         </p:blipFill>
-        <p:spPr/>
+        <p:spPr>
+          <a:xfrm>
+            <a:off x="2105186" y="1727368"/>
+            <a:ext cx="4762500" cy="4826000"/>
+          </a:xfrm>
+          <a:prstGeom prst="rect">
+            <a:avLst/>
+          </a:prstGeom>
+        </p:spPr>
       </p:pic>
     </p:spTree>
     <p:extLst>
       <p:ext uri="{BB962C8B-B14F-4D97-AF65-F5344CB8AC3E}">
-        <p14:creationId xmlns:p14="http://schemas.microsoft.com/office/powerpoint/2010/main" val="3022792865"/>
+        <p14:creationId xmlns:p14="http://schemas.microsoft.com/office/powerpoint/2010/main" val="3296525736"/>
+      </p:ext>
+    </p:extLst>
+  </p:cSld>
+  <p:clrMapOvr>
+    <a:masterClrMapping/>
+  </p:clrMapOvr>
+  <p:timing>
+    <p:tnLst>
+      <p:par>
+        <p:cTn xmlns:p14="http://schemas.microsoft.com/office/powerpoint/2010/main" id="1" dur="indefinite" restart="never" nodeType="tmRoot"/>
+      </p:par>
+    </p:tnLst>
+  </p:timing>
+</p:sld>
+</file>
+
+<file path=ppt/slides/slide12.xml><?xml version="1.0" encoding="utf-8"?>
+<p:sld xmlns:a="http://schemas.openxmlformats.org/drawingml/2006/main" xmlns:r="http://schemas.openxmlformats.org/officeDocument/2006/relationships" xmlns:p="http://schemas.openxmlformats.org/presentationml/2006/main">
+  <p:cSld>
+    <p:spTree>
+      <p:nvGrpSpPr>
+        <p:cNvPr id="1" name=""/>
+        <p:cNvGrpSpPr/>
+        <p:nvPr/>
+      </p:nvGrpSpPr>
+      <p:grpSpPr>
+        <a:xfrm>
+          <a:off x="0" y="0"/>
+          <a:ext cx="0" cy="0"/>
+          <a:chOff x="0" y="0"/>
+          <a:chExt cx="0" cy="0"/>
+        </a:xfrm>
+      </p:grpSpPr>
+      <p:sp>
+        <p:nvSpPr>
+          <p:cNvPr id="2" name="Title 1"/>
+          <p:cNvSpPr>
+            <a:spLocks noGrp="1"/>
+          </p:cNvSpPr>
+          <p:nvPr>
+            <p:ph type="title"/>
+          </p:nvPr>
+        </p:nvSpPr>
+        <p:spPr/>
+        <p:txBody>
+          <a:bodyPr/>
+          <a:lstStyle/>
+          <a:p>
+            <a:endParaRPr lang="en-US"/>
+          </a:p>
+        </p:txBody>
+      </p:sp>
+      <p:pic>
+        <p:nvPicPr>
+          <p:cNvPr id="6" name="Picture 5" descr="sunset.jpeg"/>
+          <p:cNvPicPr>
+            <a:picLocks noChangeAspect="1"/>
+          </p:cNvPicPr>
+          <p:nvPr/>
+        </p:nvPicPr>
+        <p:blipFill>
+          <a:blip r:embed="rId2">
+            <a:extLst>
+              <a:ext uri="{28A0092B-C50C-407E-A947-70E740481C1C}">
+                <a14:useLocalDpi xmlns:a14="http://schemas.microsoft.com/office/drawing/2010/main" val="0"/>
+              </a:ext>
+            </a:extLst>
+          </a:blip>
+          <a:stretch>
+            <a:fillRect/>
+          </a:stretch>
+        </p:blipFill>
+        <p:spPr>
+          <a:xfrm>
+            <a:off x="1896839" y="1389556"/>
+            <a:ext cx="5484939" cy="5484939"/>
+          </a:xfrm>
+          <a:prstGeom prst="rect">
+            <a:avLst/>
+          </a:prstGeom>
+        </p:spPr>
+      </p:pic>
+    </p:spTree>
+    <p:extLst>
+      <p:ext uri="{BB962C8B-B14F-4D97-AF65-F5344CB8AC3E}">
+        <p14:creationId xmlns:p14="http://schemas.microsoft.com/office/powerpoint/2010/main" val="2369259043"/>
+      </p:ext>
+    </p:extLst>
+  </p:cSld>
+  <p:clrMapOvr>
+    <a:masterClrMapping/>
+  </p:clrMapOvr>
+  <p:timing>
+    <p:tnLst>
+      <p:par>
+        <p:cTn xmlns:p14="http://schemas.microsoft.com/office/powerpoint/2010/main" id="1" dur="indefinite" restart="never" nodeType="tmRoot"/>
+      </p:par>
+    </p:tnLst>
+  </p:timing>
+</p:sld>
+</file>
+
+<file path=ppt/slides/slide13.xml><?xml version="1.0" encoding="utf-8"?>
+<p:sld xmlns:a="http://schemas.openxmlformats.org/drawingml/2006/main" xmlns:r="http://schemas.openxmlformats.org/officeDocument/2006/relationships" xmlns:p="http://schemas.openxmlformats.org/presentationml/2006/main">
+  <p:cSld>
+    <p:spTree>
+      <p:nvGrpSpPr>
+        <p:cNvPr id="1" name=""/>
+        <p:cNvGrpSpPr/>
+        <p:nvPr/>
+      </p:nvGrpSpPr>
+      <p:grpSpPr>
+        <a:xfrm>
+          <a:off x="0" y="0"/>
+          <a:ext cx="0" cy="0"/>
+          <a:chOff x="0" y="0"/>
+          <a:chExt cx="0" cy="0"/>
+        </a:xfrm>
+      </p:grpSpPr>
+      <p:sp>
+        <p:nvSpPr>
+          <p:cNvPr id="2" name="Title 1"/>
+          <p:cNvSpPr>
+            <a:spLocks noGrp="1"/>
+          </p:cNvSpPr>
+          <p:nvPr>
+            <p:ph type="title"/>
+          </p:nvPr>
+        </p:nvSpPr>
+        <p:spPr/>
+        <p:txBody>
+          <a:bodyPr/>
+          <a:lstStyle/>
+          <a:p>
+            <a:endParaRPr lang="en-US"/>
+          </a:p>
+        </p:txBody>
+      </p:sp>
+      <p:pic>
+        <p:nvPicPr>
+          <p:cNvPr id="6" name="Picture 5" descr="sunset_to_remove.jpg"/>
+          <p:cNvPicPr>
+            <a:picLocks noChangeAspect="1"/>
+          </p:cNvPicPr>
+          <p:nvPr/>
+        </p:nvPicPr>
+        <p:blipFill>
+          <a:blip r:embed="rId2">
+            <a:extLst>
+              <a:ext uri="{28A0092B-C50C-407E-A947-70E740481C1C}">
+                <a14:useLocalDpi xmlns:a14="http://schemas.microsoft.com/office/drawing/2010/main" val="0"/>
+              </a:ext>
+            </a:extLst>
+          </a:blip>
+          <a:stretch>
+            <a:fillRect/>
+          </a:stretch>
+        </p:blipFill>
+        <p:spPr>
+          <a:xfrm>
+            <a:off x="1830862" y="1380702"/>
+            <a:ext cx="5477298" cy="5477298"/>
+          </a:xfrm>
+          <a:prstGeom prst="rect">
+            <a:avLst/>
+          </a:prstGeom>
+        </p:spPr>
+      </p:pic>
+    </p:spTree>
+    <p:extLst>
+      <p:ext uri="{BB962C8B-B14F-4D97-AF65-F5344CB8AC3E}">
+        <p14:creationId xmlns:p14="http://schemas.microsoft.com/office/powerpoint/2010/main" val="2946018494"/>
+      </p:ext>
+    </p:extLst>
+  </p:cSld>
+  <p:clrMapOvr>
+    <a:masterClrMapping/>
+  </p:clrMapOvr>
+  <p:timing>
+    <p:tnLst>
+      <p:par>
+        <p:cTn xmlns:p14="http://schemas.microsoft.com/office/powerpoint/2010/main" id="1" dur="indefinite" restart="never" nodeType="tmRoot"/>
+      </p:par>
+    </p:tnLst>
+  </p:timing>
+</p:sld>
+</file>
+
+<file path=ppt/slides/slide14.xml><?xml version="1.0" encoding="utf-8"?>
+<p:sld xmlns:a="http://schemas.openxmlformats.org/drawingml/2006/main" xmlns:r="http://schemas.openxmlformats.org/officeDocument/2006/relationships" xmlns:p="http://schemas.openxmlformats.org/presentationml/2006/main">
+  <p:cSld>
+    <p:spTree>
+      <p:nvGrpSpPr>
+        <p:cNvPr id="1" name=""/>
+        <p:cNvGrpSpPr/>
+        <p:nvPr/>
+      </p:nvGrpSpPr>
+      <p:grpSpPr>
+        <a:xfrm>
+          <a:off x="0" y="0"/>
+          <a:ext cx="0" cy="0"/>
+          <a:chOff x="0" y="0"/>
+          <a:chExt cx="0" cy="0"/>
+        </a:xfrm>
+      </p:grpSpPr>
+      <p:sp>
+        <p:nvSpPr>
+          <p:cNvPr id="2" name="Title 1"/>
+          <p:cNvSpPr>
+            <a:spLocks noGrp="1"/>
+          </p:cNvSpPr>
+          <p:nvPr>
+            <p:ph type="title"/>
+          </p:nvPr>
+        </p:nvSpPr>
+        <p:spPr/>
+        <p:txBody>
+          <a:bodyPr/>
+          <a:lstStyle/>
+          <a:p>
+            <a:endParaRPr lang="en-US"/>
+          </a:p>
+        </p:txBody>
+      </p:sp>
+      <p:pic>
+        <p:nvPicPr>
+          <p:cNvPr id="6" name="Picture 5" descr="sunset_removed.jpg"/>
+          <p:cNvPicPr>
+            <a:picLocks noChangeAspect="1"/>
+          </p:cNvPicPr>
+          <p:nvPr/>
+        </p:nvPicPr>
+        <p:blipFill>
+          <a:blip r:embed="rId2">
+            <a:extLst>
+              <a:ext uri="{28A0092B-C50C-407E-A947-70E740481C1C}">
+                <a14:useLocalDpi xmlns:a14="http://schemas.microsoft.com/office/drawing/2010/main" val="0"/>
+              </a:ext>
+            </a:extLst>
+          </a:blip>
+          <a:stretch>
+            <a:fillRect/>
+          </a:stretch>
+        </p:blipFill>
+        <p:spPr>
+          <a:xfrm>
+            <a:off x="1830862" y="1285492"/>
+            <a:ext cx="5443102" cy="5469915"/>
+          </a:xfrm>
+          <a:prstGeom prst="rect">
+            <a:avLst/>
+          </a:prstGeom>
+        </p:spPr>
+      </p:pic>
+    </p:spTree>
+    <p:extLst>
+      <p:ext uri="{BB962C8B-B14F-4D97-AF65-F5344CB8AC3E}">
+        <p14:creationId xmlns:p14="http://schemas.microsoft.com/office/powerpoint/2010/main" val="2453966734"/>
+      </p:ext>
+    </p:extLst>
+  </p:cSld>
+  <p:clrMapOvr>
+    <a:masterClrMapping/>
+  </p:clrMapOvr>
+  <p:timing>
+    <p:tnLst>
+      <p:par>
+        <p:cTn xmlns:p14="http://schemas.microsoft.com/office/powerpoint/2010/main" id="1" dur="indefinite" restart="never" nodeType="tmRoot"/>
+      </p:par>
+    </p:tnLst>
+  </p:timing>
+</p:sld>
+</file>
+
+<file path=ppt/slides/slide15.xml><?xml version="1.0" encoding="utf-8"?>
+<p:sld xmlns:a="http://schemas.openxmlformats.org/drawingml/2006/main" xmlns:r="http://schemas.openxmlformats.org/officeDocument/2006/relationships" xmlns:p="http://schemas.openxmlformats.org/presentationml/2006/main">
+  <p:cSld>
+    <p:spTree>
+      <p:nvGrpSpPr>
+        <p:cNvPr id="1" name=""/>
+        <p:cNvGrpSpPr/>
+        <p:nvPr/>
+      </p:nvGrpSpPr>
+      <p:grpSpPr>
+        <a:xfrm>
+          <a:off x="0" y="0"/>
+          <a:ext cx="0" cy="0"/>
+          <a:chOff x="0" y="0"/>
+          <a:chExt cx="0" cy="0"/>
+        </a:xfrm>
+      </p:grpSpPr>
+      <p:sp>
+        <p:nvSpPr>
+          <p:cNvPr id="2" name="Title 1"/>
+          <p:cNvSpPr>
+            <a:spLocks noGrp="1"/>
+          </p:cNvSpPr>
+          <p:nvPr>
+            <p:ph type="title"/>
+          </p:nvPr>
+        </p:nvSpPr>
+        <p:spPr/>
+        <p:txBody>
+          <a:bodyPr/>
+          <a:lstStyle/>
+          <a:p>
+            <a:endParaRPr lang="en-US"/>
+          </a:p>
+        </p:txBody>
+      </p:sp>
+      <p:pic>
+        <p:nvPicPr>
+          <p:cNvPr id="4" name="Picture 3" descr="dolphin.jpg"/>
+          <p:cNvPicPr>
+            <a:picLocks noChangeAspect="1"/>
+          </p:cNvPicPr>
+          <p:nvPr/>
+        </p:nvPicPr>
+        <p:blipFill>
+          <a:blip r:embed="rId2">
+            <a:extLst>
+              <a:ext uri="{28A0092B-C50C-407E-A947-70E740481C1C}">
+                <a14:useLocalDpi xmlns:a14="http://schemas.microsoft.com/office/drawing/2010/main" val="0"/>
+              </a:ext>
+            </a:extLst>
+          </a:blip>
+          <a:stretch>
+            <a:fillRect/>
+          </a:stretch>
+        </p:blipFill>
+        <p:spPr>
+          <a:xfrm>
+            <a:off x="1881718" y="643645"/>
+            <a:ext cx="5491211" cy="5491211"/>
+          </a:xfrm>
+          <a:prstGeom prst="rect">
+            <a:avLst/>
+          </a:prstGeom>
+        </p:spPr>
+      </p:pic>
+    </p:spTree>
+    <p:extLst>
+      <p:ext uri="{BB962C8B-B14F-4D97-AF65-F5344CB8AC3E}">
+        <p14:creationId xmlns:p14="http://schemas.microsoft.com/office/powerpoint/2010/main" val="2647414231"/>
       </p:ext>
     </p:extLst>
   </p:cSld>
@@ -3301,7 +3679,345 @@
 </p:sld>
 </file>
 
-<file path=ppt/slides/slide3.xml><?xml version="1.0" encoding="utf-8"?>
+<file path=ppt/slides/slide16.xml><?xml version="1.0" encoding="utf-8"?>
+<p:sld xmlns:a="http://schemas.openxmlformats.org/drawingml/2006/main" xmlns:r="http://schemas.openxmlformats.org/officeDocument/2006/relationships" xmlns:p="http://schemas.openxmlformats.org/presentationml/2006/main">
+  <p:cSld>
+    <p:spTree>
+      <p:nvGrpSpPr>
+        <p:cNvPr id="1" name=""/>
+        <p:cNvGrpSpPr/>
+        <p:nvPr/>
+      </p:nvGrpSpPr>
+      <p:grpSpPr>
+        <a:xfrm>
+          <a:off x="0" y="0"/>
+          <a:ext cx="0" cy="0"/>
+          <a:chOff x="0" y="0"/>
+          <a:chExt cx="0" cy="0"/>
+        </a:xfrm>
+      </p:grpSpPr>
+      <p:sp>
+        <p:nvSpPr>
+          <p:cNvPr id="2" name="Title 1"/>
+          <p:cNvSpPr>
+            <a:spLocks noGrp="1"/>
+          </p:cNvSpPr>
+          <p:nvPr>
+            <p:ph type="title"/>
+          </p:nvPr>
+        </p:nvSpPr>
+        <p:spPr/>
+        <p:txBody>
+          <a:bodyPr/>
+          <a:lstStyle/>
+          <a:p>
+            <a:endParaRPr lang="en-US"/>
+          </a:p>
+        </p:txBody>
+      </p:sp>
+      <p:pic>
+        <p:nvPicPr>
+          <p:cNvPr id="4" name="Picture 3" descr="dolphin_to_remove.jpg"/>
+          <p:cNvPicPr>
+            <a:picLocks noChangeAspect="1"/>
+          </p:cNvPicPr>
+          <p:nvPr/>
+        </p:nvPicPr>
+        <p:blipFill>
+          <a:blip r:embed="rId2">
+            <a:extLst>
+              <a:ext uri="{28A0092B-C50C-407E-A947-70E740481C1C}">
+                <a14:useLocalDpi xmlns:a14="http://schemas.microsoft.com/office/drawing/2010/main" val="0"/>
+              </a:ext>
+            </a:extLst>
+          </a:blip>
+          <a:stretch>
+            <a:fillRect/>
+          </a:stretch>
+        </p:blipFill>
+        <p:spPr>
+          <a:xfrm>
+            <a:off x="1881717" y="643645"/>
+            <a:ext cx="5491211" cy="5491211"/>
+          </a:xfrm>
+          <a:prstGeom prst="rect">
+            <a:avLst/>
+          </a:prstGeom>
+        </p:spPr>
+      </p:pic>
+    </p:spTree>
+    <p:extLst>
+      <p:ext uri="{BB962C8B-B14F-4D97-AF65-F5344CB8AC3E}">
+        <p14:creationId xmlns:p14="http://schemas.microsoft.com/office/powerpoint/2010/main" val="1643546391"/>
+      </p:ext>
+    </p:extLst>
+  </p:cSld>
+  <p:clrMapOvr>
+    <a:masterClrMapping/>
+  </p:clrMapOvr>
+</p:sld>
+</file>
+
+<file path=ppt/slides/slide17.xml><?xml version="1.0" encoding="utf-8"?>
+<p:sld xmlns:a="http://schemas.openxmlformats.org/drawingml/2006/main" xmlns:r="http://schemas.openxmlformats.org/officeDocument/2006/relationships" xmlns:p="http://schemas.openxmlformats.org/presentationml/2006/main">
+  <p:cSld>
+    <p:spTree>
+      <p:nvGrpSpPr>
+        <p:cNvPr id="1" name=""/>
+        <p:cNvGrpSpPr/>
+        <p:nvPr/>
+      </p:nvGrpSpPr>
+      <p:grpSpPr>
+        <a:xfrm>
+          <a:off x="0" y="0"/>
+          <a:ext cx="0" cy="0"/>
+          <a:chOff x="0" y="0"/>
+          <a:chExt cx="0" cy="0"/>
+        </a:xfrm>
+      </p:grpSpPr>
+      <p:sp>
+        <p:nvSpPr>
+          <p:cNvPr id="2" name="Title 1"/>
+          <p:cNvSpPr>
+            <a:spLocks noGrp="1"/>
+          </p:cNvSpPr>
+          <p:nvPr>
+            <p:ph type="title"/>
+          </p:nvPr>
+        </p:nvSpPr>
+        <p:spPr/>
+        <p:txBody>
+          <a:bodyPr/>
+          <a:lstStyle/>
+          <a:p>
+            <a:endParaRPr lang="en-US"/>
+          </a:p>
+        </p:txBody>
+      </p:sp>
+      <p:pic>
+        <p:nvPicPr>
+          <p:cNvPr id="4" name="Picture 3" descr="dolphin_object_removed.jpg"/>
+          <p:cNvPicPr>
+            <a:picLocks noChangeAspect="1"/>
+          </p:cNvPicPr>
+          <p:nvPr/>
+        </p:nvPicPr>
+        <p:blipFill>
+          <a:blip r:embed="rId2">
+            <a:extLst>
+              <a:ext uri="{28A0092B-C50C-407E-A947-70E740481C1C}">
+                <a14:useLocalDpi xmlns:a14="http://schemas.microsoft.com/office/drawing/2010/main" val="0"/>
+              </a:ext>
+            </a:extLst>
+          </a:blip>
+          <a:stretch>
+            <a:fillRect/>
+          </a:stretch>
+        </p:blipFill>
+        <p:spPr>
+          <a:xfrm>
+            <a:off x="1881716" y="627150"/>
+            <a:ext cx="5491211" cy="5491211"/>
+          </a:xfrm>
+          <a:prstGeom prst="rect">
+            <a:avLst/>
+          </a:prstGeom>
+        </p:spPr>
+      </p:pic>
+    </p:spTree>
+    <p:extLst>
+      <p:ext uri="{BB962C8B-B14F-4D97-AF65-F5344CB8AC3E}">
+        <p14:creationId xmlns:p14="http://schemas.microsoft.com/office/powerpoint/2010/main" val="476272029"/>
+      </p:ext>
+    </p:extLst>
+  </p:cSld>
+  <p:clrMapOvr>
+    <a:masterClrMapping/>
+  </p:clrMapOvr>
+</p:sld>
+</file>
+
+<file path=ppt/slides/slide18.xml><?xml version="1.0" encoding="utf-8"?>
+<p:sld xmlns:a="http://schemas.openxmlformats.org/drawingml/2006/main" xmlns:r="http://schemas.openxmlformats.org/officeDocument/2006/relationships" xmlns:p="http://schemas.openxmlformats.org/presentationml/2006/main">
+  <p:cSld>
+    <p:spTree>
+      <p:nvGrpSpPr>
+        <p:cNvPr id="1" name=""/>
+        <p:cNvGrpSpPr/>
+        <p:nvPr/>
+      </p:nvGrpSpPr>
+      <p:grpSpPr>
+        <a:xfrm>
+          <a:off x="0" y="0"/>
+          <a:ext cx="0" cy="0"/>
+          <a:chOff x="0" y="0"/>
+          <a:chExt cx="0" cy="0"/>
+        </a:xfrm>
+      </p:grpSpPr>
+      <p:sp>
+        <p:nvSpPr>
+          <p:cNvPr id="2" name="Title 1"/>
+          <p:cNvSpPr>
+            <a:spLocks noGrp="1"/>
+          </p:cNvSpPr>
+          <p:nvPr>
+            <p:ph type="title"/>
+          </p:nvPr>
+        </p:nvSpPr>
+        <p:spPr/>
+        <p:txBody>
+          <a:bodyPr/>
+          <a:lstStyle/>
+          <a:p>
+            <a:endParaRPr lang="en-US"/>
+          </a:p>
+        </p:txBody>
+      </p:sp>
+      <p:pic>
+        <p:nvPicPr>
+          <p:cNvPr id="4" name="Picture 3" descr="dijk_seams.jpg"/>
+          <p:cNvPicPr>
+            <a:picLocks noChangeAspect="1"/>
+          </p:cNvPicPr>
+          <p:nvPr/>
+        </p:nvPicPr>
+        <p:blipFill>
+          <a:blip r:embed="rId2">
+            <a:extLst>
+              <a:ext uri="{28A0092B-C50C-407E-A947-70E740481C1C}">
+                <a14:useLocalDpi xmlns:a14="http://schemas.microsoft.com/office/drawing/2010/main" val="0"/>
+              </a:ext>
+            </a:extLst>
+          </a:blip>
+          <a:stretch>
+            <a:fillRect/>
+          </a:stretch>
+        </p:blipFill>
+        <p:spPr>
+          <a:xfrm>
+            <a:off x="457200" y="2359026"/>
+            <a:ext cx="3089007" cy="3089007"/>
+          </a:xfrm>
+          <a:prstGeom prst="rect">
+            <a:avLst/>
+          </a:prstGeom>
+        </p:spPr>
+      </p:pic>
+      <p:sp>
+        <p:nvSpPr>
+          <p:cNvPr id="5" name="TextBox 4"/>
+          <p:cNvSpPr txBox="1"/>
+          <p:nvPr/>
+        </p:nvSpPr>
+        <p:spPr>
+          <a:xfrm>
+            <a:off x="907184" y="5888890"/>
+            <a:ext cx="2639023" cy="369332"/>
+          </a:xfrm>
+          <a:prstGeom prst="rect">
+            <a:avLst/>
+          </a:prstGeom>
+          <a:noFill/>
+        </p:spPr>
+        <p:txBody>
+          <a:bodyPr wrap="square" rtlCol="0">
+            <a:spAutoFit/>
+          </a:bodyPr>
+          <a:lstStyle/>
+          <a:p>
+            <a:r>
+              <a:rPr lang="en-US" dirty="0" err="1" smtClean="0"/>
+              <a:t>Dijkstra’s</a:t>
+            </a:r>
+            <a:r>
+              <a:rPr lang="en-US" dirty="0" smtClean="0"/>
+              <a:t> Algorithm</a:t>
+            </a:r>
+            <a:endParaRPr lang="en-US" dirty="0"/>
+          </a:p>
+        </p:txBody>
+      </p:sp>
+      <p:sp>
+        <p:nvSpPr>
+          <p:cNvPr id="6" name="TextBox 5"/>
+          <p:cNvSpPr txBox="1"/>
+          <p:nvPr/>
+        </p:nvSpPr>
+        <p:spPr>
+          <a:xfrm>
+            <a:off x="5331595" y="6045231"/>
+            <a:ext cx="2639023" cy="369332"/>
+          </a:xfrm>
+          <a:prstGeom prst="rect">
+            <a:avLst/>
+          </a:prstGeom>
+          <a:noFill/>
+        </p:spPr>
+        <p:txBody>
+          <a:bodyPr wrap="square" rtlCol="0">
+            <a:spAutoFit/>
+          </a:bodyPr>
+          <a:lstStyle/>
+          <a:p>
+            <a:r>
+              <a:rPr lang="en-US" dirty="0" smtClean="0"/>
+              <a:t>Dynamic Programming</a:t>
+            </a:r>
+            <a:endParaRPr lang="en-US" dirty="0"/>
+          </a:p>
+        </p:txBody>
+      </p:sp>
+      <p:pic>
+        <p:nvPicPr>
+          <p:cNvPr id="7" name="Picture 6" descr="dyn_seams.jpg"/>
+          <p:cNvPicPr>
+            <a:picLocks noChangeAspect="1"/>
+          </p:cNvPicPr>
+          <p:nvPr/>
+        </p:nvPicPr>
+        <p:blipFill>
+          <a:blip r:embed="rId3">
+            <a:extLst>
+              <a:ext uri="{28A0092B-C50C-407E-A947-70E740481C1C}">
+                <a14:useLocalDpi xmlns:a14="http://schemas.microsoft.com/office/drawing/2010/main" val="0"/>
+              </a:ext>
+            </a:extLst>
+          </a:blip>
+          <a:stretch>
+            <a:fillRect/>
+          </a:stretch>
+        </p:blipFill>
+        <p:spPr>
+          <a:xfrm>
+            <a:off x="4832129" y="2309544"/>
+            <a:ext cx="3138489" cy="3138489"/>
+          </a:xfrm>
+          <a:prstGeom prst="rect">
+            <a:avLst/>
+          </a:prstGeom>
+        </p:spPr>
+      </p:pic>
+    </p:spTree>
+    <p:extLst>
+      <p:ext uri="{BB962C8B-B14F-4D97-AF65-F5344CB8AC3E}">
+        <p14:creationId xmlns:p14="http://schemas.microsoft.com/office/powerpoint/2010/main" val="874250402"/>
+      </p:ext>
+    </p:extLst>
+  </p:cSld>
+  <p:clrMapOvr>
+    <a:masterClrMapping/>
+  </p:clrMapOvr>
+  <p:timing>
+    <p:tnLst>
+      <p:par>
+        <p:cTn xmlns:p14="http://schemas.microsoft.com/office/powerpoint/2010/main" id="1" dur="indefinite" restart="never" nodeType="tmRoot"/>
+      </p:par>
+    </p:tnLst>
+  </p:timing>
+</p:sld>
+</file>
+
+<file path=ppt/slides/slide2.xml><?xml version="1.0" encoding="utf-8"?>
 <p:sld xmlns:a="http://schemas.openxmlformats.org/drawingml/2006/main" xmlns:r="http://schemas.openxmlformats.org/officeDocument/2006/relationships" xmlns:p="http://schemas.openxmlformats.org/presentationml/2006/main">
   <p:cSld>
     <p:spTree>
@@ -3377,6 +4093,87 @@
   <p:clrMapOvr>
     <a:masterClrMapping/>
   </p:clrMapOvr>
+  <p:timing>
+    <p:tnLst>
+      <p:par>
+        <p:cTn xmlns:p14="http://schemas.microsoft.com/office/powerpoint/2010/main" id="1" dur="indefinite" restart="never" nodeType="tmRoot"/>
+      </p:par>
+    </p:tnLst>
+  </p:timing>
+</p:sld>
+</file>
+
+<file path=ppt/slides/slide3.xml><?xml version="1.0" encoding="utf-8"?>
+<p:sld xmlns:a="http://schemas.openxmlformats.org/drawingml/2006/main" xmlns:r="http://schemas.openxmlformats.org/officeDocument/2006/relationships" xmlns:p="http://schemas.openxmlformats.org/presentationml/2006/main">
+  <p:cSld>
+    <p:spTree>
+      <p:nvGrpSpPr>
+        <p:cNvPr id="1" name=""/>
+        <p:cNvGrpSpPr/>
+        <p:nvPr/>
+      </p:nvGrpSpPr>
+      <p:grpSpPr>
+        <a:xfrm>
+          <a:off x="0" y="0"/>
+          <a:ext cx="0" cy="0"/>
+          <a:chOff x="0" y="0"/>
+          <a:chExt cx="0" cy="0"/>
+        </a:xfrm>
+      </p:grpSpPr>
+      <p:sp>
+        <p:nvSpPr>
+          <p:cNvPr id="2" name="Title 1"/>
+          <p:cNvSpPr>
+            <a:spLocks noGrp="1"/>
+          </p:cNvSpPr>
+          <p:nvPr>
+            <p:ph type="title"/>
+          </p:nvPr>
+        </p:nvSpPr>
+        <p:spPr/>
+        <p:txBody>
+          <a:bodyPr/>
+          <a:lstStyle/>
+          <a:p>
+            <a:endParaRPr lang="en-US"/>
+          </a:p>
+        </p:txBody>
+      </p:sp>
+      <p:pic>
+        <p:nvPicPr>
+          <p:cNvPr id="4" name="Content Placeholder 3" descr="energy_map_sobel.jpg"/>
+          <p:cNvPicPr>
+            <a:picLocks noGrp="1" noChangeAspect="1"/>
+          </p:cNvPicPr>
+          <p:nvPr>
+            <p:ph idx="1"/>
+          </p:nvPr>
+        </p:nvPicPr>
+        <p:blipFill>
+          <a:blip r:embed="rId2">
+            <a:extLst>
+              <a:ext uri="{28A0092B-C50C-407E-A947-70E740481C1C}">
+                <a14:useLocalDpi xmlns:a14="http://schemas.microsoft.com/office/drawing/2010/main" val="0"/>
+              </a:ext>
+            </a:extLst>
+          </a:blip>
+          <a:srcRect t="2081" b="2081"/>
+          <a:stretch>
+            <a:fillRect/>
+          </a:stretch>
+        </p:blipFill>
+        <p:spPr/>
+      </p:pic>
+    </p:spTree>
+    <p:extLst>
+      <p:ext uri="{BB962C8B-B14F-4D97-AF65-F5344CB8AC3E}">
+        <p14:creationId xmlns:p14="http://schemas.microsoft.com/office/powerpoint/2010/main" val="3151643685"/>
+      </p:ext>
+    </p:extLst>
+  </p:cSld>
+  <p:clrMapOvr>
+    <a:masterClrMapping/>
+  </p:clrMapOvr>
 </p:sld>
 </file>
 
@@ -3412,13 +4209,17 @@
           <a:bodyPr/>
           <a:lstStyle/>
           <a:p>
-            <a:endParaRPr lang="en-US"/>
+            <a:r>
+              <a:rPr lang="en-US" dirty="0" err="1" smtClean="0"/>
+              <a:t>Sobel</a:t>
+            </a:r>
+            <a:endParaRPr lang="en-US" dirty="0"/>
           </a:p>
         </p:txBody>
       </p:sp>
       <p:pic>
         <p:nvPicPr>
-          <p:cNvPr id="4" name="Content Placeholder 3" descr="giza_shrank.jpg"/>
+          <p:cNvPr id="4" name="Content Placeholder 3" descr="sobel.jpg"/>
           <p:cNvPicPr>
             <a:picLocks noGrp="1" noChangeAspect="1"/>
           </p:cNvPicPr>
@@ -3434,7 +4235,7 @@
               </a:ext>
             </a:extLst>
           </a:blip>
-          <a:srcRect t="14212" b="14212"/>
+          <a:srcRect t="2081" b="2081"/>
           <a:stretch>
             <a:fillRect/>
           </a:stretch>
@@ -3444,13 +4245,20 @@
     </p:spTree>
     <p:extLst>
       <p:ext uri="{BB962C8B-B14F-4D97-AF65-F5344CB8AC3E}">
-        <p14:creationId xmlns:p14="http://schemas.microsoft.com/office/powerpoint/2010/main" val="1574259392"/>
+        <p14:creationId xmlns:p14="http://schemas.microsoft.com/office/powerpoint/2010/main" val="979152595"/>
       </p:ext>
     </p:extLst>
   </p:cSld>
   <p:clrMapOvr>
     <a:masterClrMapping/>
   </p:clrMapOvr>
+  <p:timing>
+    <p:tnLst>
+      <p:par>
+        <p:cTn xmlns:p14="http://schemas.microsoft.com/office/powerpoint/2010/main" id="1" dur="indefinite" restart="never" nodeType="tmRoot"/>
+      </p:par>
+    </p:tnLst>
+  </p:timing>
 </p:sld>
 </file>
 
@@ -3486,17 +4294,13 @@
           <a:bodyPr/>
           <a:lstStyle/>
           <a:p>
-            <a:r>
-              <a:rPr lang="en-US" dirty="0" err="1" smtClean="0"/>
-              <a:t>Sobel</a:t>
-            </a:r>
-            <a:endParaRPr lang="en-US" dirty="0"/>
+            <a:endParaRPr lang="en-US"/>
           </a:p>
         </p:txBody>
       </p:sp>
       <p:pic>
         <p:nvPicPr>
-          <p:cNvPr id="4" name="Content Placeholder 3" descr="sobel.jpg"/>
+          <p:cNvPr id="4" name="Content Placeholder 3" descr="sobel5.jpg"/>
           <p:cNvPicPr>
             <a:picLocks noGrp="1" noChangeAspect="1"/>
           </p:cNvPicPr>
@@ -3522,7 +4326,7 @@
     </p:spTree>
     <p:extLst>
       <p:ext uri="{BB962C8B-B14F-4D97-AF65-F5344CB8AC3E}">
-        <p14:creationId xmlns:p14="http://schemas.microsoft.com/office/powerpoint/2010/main" val="979152595"/>
+        <p14:creationId xmlns:p14="http://schemas.microsoft.com/office/powerpoint/2010/main" val="4222075177"/>
       </p:ext>
     </p:extLst>
   </p:cSld>
@@ -3565,8 +4369,8 @@
           <a:lstStyle/>
           <a:p>
             <a:r>
-              <a:rPr lang="en-US" dirty="0" smtClean="0"/>
-              <a:t>Kroon</a:t>
+              <a:rPr lang="en-US" dirty="0" err="1" smtClean="0"/>
+              <a:t>Scharr</a:t>
             </a:r>
             <a:endParaRPr lang="en-US" dirty="0"/>
           </a:p>
@@ -3574,7 +4378,7 @@
       </p:sp>
       <p:pic>
         <p:nvPicPr>
-          <p:cNvPr id="4" name="Content Placeholder 3" descr="kroon.jpg"/>
+          <p:cNvPr id="4" name="Content Placeholder 3" descr="scharr.jpg"/>
           <p:cNvPicPr>
             <a:picLocks noGrp="1" noChangeAspect="1"/>
           </p:cNvPicPr>
@@ -3600,6 +4404,91 @@
     </p:spTree>
     <p:extLst>
       <p:ext uri="{BB962C8B-B14F-4D97-AF65-F5344CB8AC3E}">
+        <p14:creationId xmlns:p14="http://schemas.microsoft.com/office/powerpoint/2010/main" val="3022792865"/>
+      </p:ext>
+    </p:extLst>
+  </p:cSld>
+  <p:clrMapOvr>
+    <a:masterClrMapping/>
+  </p:clrMapOvr>
+  <p:timing>
+    <p:tnLst>
+      <p:par>
+        <p:cTn xmlns:p14="http://schemas.microsoft.com/office/powerpoint/2010/main" id="1" dur="indefinite" restart="never" nodeType="tmRoot"/>
+      </p:par>
+    </p:tnLst>
+  </p:timing>
+</p:sld>
+</file>
+
+<file path=ppt/slides/slide7.xml><?xml version="1.0" encoding="utf-8"?>
+<p:sld xmlns:a="http://schemas.openxmlformats.org/drawingml/2006/main" xmlns:r="http://schemas.openxmlformats.org/officeDocument/2006/relationships" xmlns:p="http://schemas.openxmlformats.org/presentationml/2006/main">
+  <p:cSld>
+    <p:spTree>
+      <p:nvGrpSpPr>
+        <p:cNvPr id="1" name=""/>
+        <p:cNvGrpSpPr/>
+        <p:nvPr/>
+      </p:nvGrpSpPr>
+      <p:grpSpPr>
+        <a:xfrm>
+          <a:off x="0" y="0"/>
+          <a:ext cx="0" cy="0"/>
+          <a:chOff x="0" y="0"/>
+          <a:chExt cx="0" cy="0"/>
+        </a:xfrm>
+      </p:grpSpPr>
+      <p:sp>
+        <p:nvSpPr>
+          <p:cNvPr id="2" name="Title 1"/>
+          <p:cNvSpPr>
+            <a:spLocks noGrp="1"/>
+          </p:cNvSpPr>
+          <p:nvPr>
+            <p:ph type="title"/>
+          </p:nvPr>
+        </p:nvSpPr>
+        <p:spPr/>
+        <p:txBody>
+          <a:bodyPr/>
+          <a:lstStyle/>
+          <a:p>
+            <a:r>
+              <a:rPr lang="en-US" dirty="0" smtClean="0"/>
+              <a:t>Kroon</a:t>
+            </a:r>
+            <a:endParaRPr lang="en-US" dirty="0"/>
+          </a:p>
+        </p:txBody>
+      </p:sp>
+      <p:pic>
+        <p:nvPicPr>
+          <p:cNvPr id="4" name="Content Placeholder 3" descr="kroon.jpg"/>
+          <p:cNvPicPr>
+            <a:picLocks noGrp="1" noChangeAspect="1"/>
+          </p:cNvPicPr>
+          <p:nvPr>
+            <p:ph idx="1"/>
+          </p:nvPr>
+        </p:nvPicPr>
+        <p:blipFill>
+          <a:blip r:embed="rId2">
+            <a:extLst>
+              <a:ext uri="{28A0092B-C50C-407E-A947-70E740481C1C}">
+                <a14:useLocalDpi xmlns:a14="http://schemas.microsoft.com/office/drawing/2010/main" val="0"/>
+              </a:ext>
+            </a:extLst>
+          </a:blip>
+          <a:srcRect t="2081" b="2081"/>
+          <a:stretch>
+            <a:fillRect/>
+          </a:stretch>
+        </p:blipFill>
+        <p:spPr/>
+      </p:pic>
+    </p:spTree>
+    <p:extLst>
+      <p:ext uri="{BB962C8B-B14F-4D97-AF65-F5344CB8AC3E}">
         <p14:creationId xmlns:p14="http://schemas.microsoft.com/office/powerpoint/2010/main" val="2652681314"/>
       </p:ext>
     </p:extLst>
@@ -3607,10 +4496,98 @@
   <p:clrMapOvr>
     <a:masterClrMapping/>
   </p:clrMapOvr>
+  <p:timing>
+    <p:tnLst>
+      <p:par>
+        <p:cTn xmlns:p14="http://schemas.microsoft.com/office/powerpoint/2010/main" id="1" dur="indefinite" restart="never" nodeType="tmRoot"/>
+      </p:par>
+    </p:tnLst>
+  </p:timing>
 </p:sld>
 </file>
 
-<file path=ppt/slides/slide7.xml><?xml version="1.0" encoding="utf-8"?>
+<file path=ppt/slides/slide8.xml><?xml version="1.0" encoding="utf-8"?>
+<p:sld xmlns:a="http://schemas.openxmlformats.org/drawingml/2006/main" xmlns:r="http://schemas.openxmlformats.org/officeDocument/2006/relationships" xmlns:p="http://schemas.openxmlformats.org/presentationml/2006/main">
+  <p:cSld>
+    <p:spTree>
+      <p:nvGrpSpPr>
+        <p:cNvPr id="1" name=""/>
+        <p:cNvGrpSpPr/>
+        <p:nvPr/>
+      </p:nvGrpSpPr>
+      <p:grpSpPr>
+        <a:xfrm>
+          <a:off x="0" y="0"/>
+          <a:ext cx="0" cy="0"/>
+          <a:chOff x="0" y="0"/>
+          <a:chExt cx="0" cy="0"/>
+        </a:xfrm>
+      </p:grpSpPr>
+      <p:sp>
+        <p:nvSpPr>
+          <p:cNvPr id="2" name="Title 1"/>
+          <p:cNvSpPr>
+            <a:spLocks noGrp="1"/>
+          </p:cNvSpPr>
+          <p:nvPr>
+            <p:ph type="title"/>
+          </p:nvPr>
+        </p:nvSpPr>
+        <p:spPr/>
+        <p:txBody>
+          <a:bodyPr/>
+          <a:lstStyle/>
+          <a:p>
+            <a:endParaRPr lang="en-US"/>
+          </a:p>
+        </p:txBody>
+      </p:sp>
+      <p:pic>
+        <p:nvPicPr>
+          <p:cNvPr id="4" name="Content Placeholder 3" descr="giza_shrank.jpg"/>
+          <p:cNvPicPr>
+            <a:picLocks noGrp="1" noChangeAspect="1"/>
+          </p:cNvPicPr>
+          <p:nvPr>
+            <p:ph idx="1"/>
+          </p:nvPr>
+        </p:nvPicPr>
+        <p:blipFill>
+          <a:blip r:embed="rId2">
+            <a:extLst>
+              <a:ext uri="{28A0092B-C50C-407E-A947-70E740481C1C}">
+                <a14:useLocalDpi xmlns:a14="http://schemas.microsoft.com/office/drawing/2010/main" val="0"/>
+              </a:ext>
+            </a:extLst>
+          </a:blip>
+          <a:srcRect t="14212" b="14212"/>
+          <a:stretch>
+            <a:fillRect/>
+          </a:stretch>
+        </p:blipFill>
+        <p:spPr/>
+      </p:pic>
+    </p:spTree>
+    <p:extLst>
+      <p:ext uri="{BB962C8B-B14F-4D97-AF65-F5344CB8AC3E}">
+        <p14:creationId xmlns:p14="http://schemas.microsoft.com/office/powerpoint/2010/main" val="1574259392"/>
+      </p:ext>
+    </p:extLst>
+  </p:cSld>
+  <p:clrMapOvr>
+    <a:masterClrMapping/>
+  </p:clrMapOvr>
+  <p:timing>
+    <p:tnLst>
+      <p:par>
+        <p:cTn xmlns:p14="http://schemas.microsoft.com/office/powerpoint/2010/main" id="1" dur="indefinite" restart="never" nodeType="tmRoot"/>
+      </p:par>
+    </p:tnLst>
+  </p:timing>
+</p:sld>
+</file>
+
+<file path=ppt/slides/slide9.xml><?xml version="1.0" encoding="utf-8"?>
 <p:sld xmlns:a="http://schemas.openxmlformats.org/drawingml/2006/main" xmlns:r="http://schemas.openxmlformats.org/officeDocument/2006/relationships" xmlns:p="http://schemas.openxmlformats.org/presentationml/2006/main">
   <p:cSld>
     <p:spTree>
@@ -3686,164 +4663,13 @@
   <p:clrMapOvr>
     <a:masterClrMapping/>
   </p:clrMapOvr>
-</p:sld>
-</file>
-
-<file path=ppt/slides/slide8.xml><?xml version="1.0" encoding="utf-8"?>
-<p:sld xmlns:a="http://schemas.openxmlformats.org/drawingml/2006/main" xmlns:r="http://schemas.openxmlformats.org/officeDocument/2006/relationships" xmlns:p="http://schemas.openxmlformats.org/presentationml/2006/main">
-  <p:cSld>
-    <p:spTree>
-      <p:nvGrpSpPr>
-        <p:cNvPr id="1" name=""/>
-        <p:cNvGrpSpPr/>
-        <p:nvPr/>
-      </p:nvGrpSpPr>
-      <p:grpSpPr>
-        <a:xfrm>
-          <a:off x="0" y="0"/>
-          <a:ext cx="0" cy="0"/>
-          <a:chOff x="0" y="0"/>
-          <a:chExt cx="0" cy="0"/>
-        </a:xfrm>
-      </p:grpSpPr>
-      <p:sp>
-        <p:nvSpPr>
-          <p:cNvPr id="2" name="Title 1"/>
-          <p:cNvSpPr>
-            <a:spLocks noGrp="1"/>
-          </p:cNvSpPr>
-          <p:nvPr>
-            <p:ph type="title"/>
-          </p:nvPr>
-        </p:nvSpPr>
-        <p:spPr/>
-        <p:txBody>
-          <a:bodyPr/>
-          <a:lstStyle/>
-          <a:p>
-            <a:endParaRPr lang="en-US"/>
-          </a:p>
-        </p:txBody>
-      </p:sp>
-      <p:pic>
-        <p:nvPicPr>
-          <p:cNvPr id="6" name="Picture 5" descr="night_seams.jpg"/>
-          <p:cNvPicPr>
-            <a:picLocks noChangeAspect="1"/>
-          </p:cNvPicPr>
-          <p:nvPr/>
-        </p:nvPicPr>
-        <p:blipFill>
-          <a:blip r:embed="rId2">
-            <a:extLst>
-              <a:ext uri="{28A0092B-C50C-407E-A947-70E740481C1C}">
-                <a14:useLocalDpi xmlns:a14="http://schemas.microsoft.com/office/drawing/2010/main" val="0"/>
-              </a:ext>
-            </a:extLst>
-          </a:blip>
-          <a:stretch>
-            <a:fillRect/>
-          </a:stretch>
-        </p:blipFill>
-        <p:spPr>
-          <a:xfrm>
-            <a:off x="1890761" y="274638"/>
-            <a:ext cx="4762500" cy="6350000"/>
-          </a:xfrm>
-          <a:prstGeom prst="rect">
-            <a:avLst/>
-          </a:prstGeom>
-        </p:spPr>
-      </p:pic>
-    </p:spTree>
-    <p:extLst>
-      <p:ext uri="{BB962C8B-B14F-4D97-AF65-F5344CB8AC3E}">
-        <p14:creationId xmlns:p14="http://schemas.microsoft.com/office/powerpoint/2010/main" val="3936392864"/>
-      </p:ext>
-    </p:extLst>
-  </p:cSld>
-  <p:clrMapOvr>
-    <a:masterClrMapping/>
-  </p:clrMapOvr>
-</p:sld>
-</file>
-
-<file path=ppt/slides/slide9.xml><?xml version="1.0" encoding="utf-8"?>
-<p:sld xmlns:a="http://schemas.openxmlformats.org/drawingml/2006/main" xmlns:r="http://schemas.openxmlformats.org/officeDocument/2006/relationships" xmlns:p="http://schemas.openxmlformats.org/presentationml/2006/main">
-  <p:cSld>
-    <p:spTree>
-      <p:nvGrpSpPr>
-        <p:cNvPr id="1" name=""/>
-        <p:cNvGrpSpPr/>
-        <p:nvPr/>
-      </p:nvGrpSpPr>
-      <p:grpSpPr>
-        <a:xfrm>
-          <a:off x="0" y="0"/>
-          <a:ext cx="0" cy="0"/>
-          <a:chOff x="0" y="0"/>
-          <a:chExt cx="0" cy="0"/>
-        </a:xfrm>
-      </p:grpSpPr>
-      <p:sp>
-        <p:nvSpPr>
-          <p:cNvPr id="2" name="Title 1"/>
-          <p:cNvSpPr>
-            <a:spLocks noGrp="1"/>
-          </p:cNvSpPr>
-          <p:nvPr>
-            <p:ph type="title"/>
-          </p:nvPr>
-        </p:nvSpPr>
-        <p:spPr/>
-        <p:txBody>
-          <a:bodyPr/>
-          <a:lstStyle/>
-          <a:p>
-            <a:endParaRPr lang="en-US"/>
-          </a:p>
-        </p:txBody>
-      </p:sp>
-      <p:pic>
-        <p:nvPicPr>
-          <p:cNvPr id="4" name="Picture 3" descr="night_shrank.jpg"/>
-          <p:cNvPicPr>
-            <a:picLocks noChangeAspect="1"/>
-          </p:cNvPicPr>
-          <p:nvPr/>
-        </p:nvPicPr>
-        <p:blipFill>
-          <a:blip r:embed="rId2">
-            <a:extLst>
-              <a:ext uri="{28A0092B-C50C-407E-A947-70E740481C1C}">
-                <a14:useLocalDpi xmlns:a14="http://schemas.microsoft.com/office/drawing/2010/main" val="0"/>
-              </a:ext>
-            </a:extLst>
-          </a:blip>
-          <a:stretch>
-            <a:fillRect/>
-          </a:stretch>
-        </p:blipFill>
-        <p:spPr>
-          <a:xfrm>
-            <a:off x="2105186" y="1727368"/>
-            <a:ext cx="4762500" cy="4826000"/>
-          </a:xfrm>
-          <a:prstGeom prst="rect">
-            <a:avLst/>
-          </a:prstGeom>
-        </p:spPr>
-      </p:pic>
-    </p:spTree>
-    <p:extLst>
-      <p:ext uri="{BB962C8B-B14F-4D97-AF65-F5344CB8AC3E}">
-        <p14:creationId xmlns:p14="http://schemas.microsoft.com/office/powerpoint/2010/main" val="3296525736"/>
-      </p:ext>
-    </p:extLst>
-  </p:cSld>
-  <p:clrMapOvr>
-    <a:masterClrMapping/>
-  </p:clrMapOvr>
+  <p:timing>
+    <p:tnLst>
+      <p:par>
+        <p:cTn xmlns:p14="http://schemas.microsoft.com/office/powerpoint/2010/main" id="1" dur="indefinite" restart="never" nodeType="tmRoot"/>
+      </p:par>
+    </p:tnLst>
+  </p:timing>
 </p:sld>
 </file>
 

</xml_diff>

<commit_message>
made smaller bird example
</commit_message>
<xml_diff>
--- a/seam-carving.pptx
+++ b/seam-carving.pptx
@@ -4294,7 +4294,15 @@
           <a:bodyPr/>
           <a:lstStyle/>
           <a:p>
-            <a:endParaRPr lang="en-US"/>
+            <a:r>
+              <a:rPr lang="en-US" dirty="0" err="1" smtClean="0"/>
+              <a:t>Sobel</a:t>
+            </a:r>
+            <a:r>
+              <a:rPr lang="en-US" dirty="0" smtClean="0"/>
+              <a:t> 5</a:t>
+            </a:r>
+            <a:endParaRPr lang="en-US" dirty="0"/>
           </a:p>
         </p:txBody>
       </p:sp>

</xml_diff>